<commit_message>
power point has test code for ship movement
</commit_message>
<xml_diff>
--- a/Project Starfighter 1.1.pptx
+++ b/Project Starfighter 1.1.pptx
@@ -10,11 +10,12 @@
     <p:sldId id="279" r:id="rId4"/>
     <p:sldId id="274" r:id="rId5"/>
     <p:sldId id="277" r:id="rId6"/>
-    <p:sldId id="284" r:id="rId7"/>
-    <p:sldId id="282" r:id="rId8"/>
-    <p:sldId id="269" r:id="rId9"/>
-    <p:sldId id="270" r:id="rId10"/>
-    <p:sldId id="271" r:id="rId11"/>
+    <p:sldId id="285" r:id="rId7"/>
+    <p:sldId id="284" r:id="rId8"/>
+    <p:sldId id="282" r:id="rId9"/>
+    <p:sldId id="269" r:id="rId10"/>
+    <p:sldId id="270" r:id="rId11"/>
+    <p:sldId id="271" r:id="rId12"/>
   </p:sldIdLst>
   <p:sldSz cx="9144000" cy="6858000" type="screen4x3"/>
   <p:notesSz cx="6858000" cy="9144000"/>
@@ -3408,38 +3409,30 @@
             </a:r>
             <a:r>
               <a:rPr lang="en-US" dirty="0" smtClean="0"/>
-              <a:t> </a:t>
-            </a:r>
+              <a:t> 1.1</a:t>
+            </a:r>
+            <a:endParaRPr lang="en-US" dirty="0"/>
+          </a:p>
+        </p:txBody>
+      </p:sp>
+      <p:sp>
+        <p:nvSpPr>
+          <p:cNvPr id="3" name="Subtitle 2"/>
+          <p:cNvSpPr>
+            <a:spLocks noGrp="1"/>
+          </p:cNvSpPr>
+          <p:nvPr>
+            <p:ph type="subTitle" idx="1"/>
+          </p:nvPr>
+        </p:nvSpPr>
+        <p:spPr/>
+        <p:txBody>
+          <a:bodyPr/>
+          <a:lstStyle/>
+          <a:p>
             <a:r>
               <a:rPr lang="en-US" dirty="0" smtClean="0"/>
-              <a:t>1.1</a:t>
-            </a:r>
-            <a:endParaRPr lang="en-US" dirty="0"/>
-          </a:p>
-        </p:txBody>
-      </p:sp>
-      <p:sp>
-        <p:nvSpPr>
-          <p:cNvPr id="3" name="Subtitle 2"/>
-          <p:cNvSpPr>
-            <a:spLocks noGrp="1"/>
-          </p:cNvSpPr>
-          <p:nvPr>
-            <p:ph type="subTitle" idx="1"/>
-          </p:nvPr>
-        </p:nvSpPr>
-        <p:spPr/>
-        <p:txBody>
-          <a:bodyPr/>
-          <a:lstStyle/>
-          <a:p>
-            <a:r>
-              <a:rPr lang="en-US" dirty="0" smtClean="0"/>
-              <a:t>Team </a:t>
-            </a:r>
-            <a:r>
-              <a:rPr lang="en-US" dirty="0" smtClean="0"/>
-              <a:t>15</a:t>
+              <a:t>Team 15</a:t>
             </a:r>
             <a:endParaRPr lang="en-US" dirty="0"/>
           </a:p>
@@ -3494,11 +3487,97 @@
           <a:p>
             <a:r>
               <a:rPr lang="en-US" dirty="0" smtClean="0"/>
-              <a:t>Plans for version </a:t>
-            </a:r>
+              <a:t>Status of the Game</a:t>
+            </a:r>
+            <a:endParaRPr lang="en-US" dirty="0"/>
+          </a:p>
+        </p:txBody>
+      </p:sp>
+      <p:sp>
+        <p:nvSpPr>
+          <p:cNvPr id="3" name="Content Placeholder 2"/>
+          <p:cNvSpPr>
+            <a:spLocks noGrp="1"/>
+          </p:cNvSpPr>
+          <p:nvPr>
+            <p:ph idx="1"/>
+          </p:nvPr>
+        </p:nvSpPr>
+        <p:spPr/>
+        <p:txBody>
+          <a:bodyPr/>
+          <a:lstStyle/>
+          <a:p>
             <a:r>
               <a:rPr lang="en-US" dirty="0" smtClean="0"/>
-              <a:t>1.2</a:t>
+              <a:t>At this point all of the menu options except for high score are complete.</a:t>
+            </a:r>
+          </a:p>
+          <a:p>
+            <a:r>
+              <a:rPr lang="en-US" dirty="0" smtClean="0"/>
+              <a:t>The ship can move. The background is also set to auto scroll.</a:t>
+            </a:r>
+          </a:p>
+          <a:p>
+            <a:r>
+              <a:rPr lang="en-US" dirty="0" smtClean="0"/>
+              <a:t>The ship can now shoot a laser.</a:t>
+            </a:r>
+            <a:endParaRPr lang="en-US" dirty="0"/>
+          </a:p>
+        </p:txBody>
+      </p:sp>
+    </p:spTree>
+  </p:cSld>
+  <p:clrMapOvr>
+    <a:masterClrMapping/>
+  </p:clrMapOvr>
+  <p:timing>
+    <p:tnLst>
+      <p:par>
+        <p:cTn id="1" dur="indefinite" restart="never" nodeType="tmRoot"/>
+      </p:par>
+    </p:tnLst>
+  </p:timing>
+</p:sld>
+</file>
+
+<file path=ppt/slides/slide11.xml><?xml version="1.0" encoding="utf-8"?>
+<p:sld xmlns:a="http://schemas.openxmlformats.org/drawingml/2006/main" xmlns:r="http://schemas.openxmlformats.org/officeDocument/2006/relationships" xmlns:p="http://schemas.openxmlformats.org/presentationml/2006/main">
+  <p:cSld>
+    <p:spTree>
+      <p:nvGrpSpPr>
+        <p:cNvPr id="1" name=""/>
+        <p:cNvGrpSpPr/>
+        <p:nvPr/>
+      </p:nvGrpSpPr>
+      <p:grpSpPr>
+        <a:xfrm>
+          <a:off x="0" y="0"/>
+          <a:ext cx="0" cy="0"/>
+          <a:chOff x="0" y="0"/>
+          <a:chExt cx="0" cy="0"/>
+        </a:xfrm>
+      </p:grpSpPr>
+      <p:sp>
+        <p:nvSpPr>
+          <p:cNvPr id="2" name="Title 1"/>
+          <p:cNvSpPr>
+            <a:spLocks noGrp="1"/>
+          </p:cNvSpPr>
+          <p:nvPr>
+            <p:ph type="title"/>
+          </p:nvPr>
+        </p:nvSpPr>
+        <p:spPr/>
+        <p:txBody>
+          <a:bodyPr/>
+          <a:lstStyle/>
+          <a:p>
+            <a:r>
+              <a:rPr lang="en-US" dirty="0" smtClean="0"/>
+              <a:t>Plans for version 1.2</a:t>
             </a:r>
             <a:endParaRPr lang="en-US" dirty="0"/>
           </a:p>
@@ -3600,15 +3679,7 @@
           <a:p>
             <a:r>
               <a:rPr lang="en-US" dirty="0" smtClean="0"/>
-              <a:t>User Stories for </a:t>
-            </a:r>
-            <a:r>
-              <a:rPr lang="en-US" dirty="0" smtClean="0"/>
-              <a:t>1.1 </a:t>
-            </a:r>
-            <a:r>
-              <a:rPr lang="en-US" dirty="0" smtClean="0"/>
-              <a:t>Part 1</a:t>
+              <a:t>User Stories for 1.1 Part 1</a:t>
             </a:r>
             <a:endParaRPr lang="en-US" dirty="0"/>
           </a:p>
@@ -3631,11 +3702,7 @@
           <a:p>
             <a:r>
               <a:rPr lang="en-US" b="1" dirty="0" smtClean="0"/>
-              <a:t>As a user upon starting the application I want to hear music. Upon starting the game new music is </a:t>
-            </a:r>
-            <a:r>
-              <a:rPr lang="en-US" b="1" dirty="0" smtClean="0"/>
-              <a:t>played</a:t>
+              <a:t>As a user upon starting the application I want to hear music. Upon starting the game new music is played</a:t>
             </a:r>
           </a:p>
           <a:p>
@@ -3738,7 +3805,7 @@
     </p:spTree>
     <p:extLst>
       <p:ext uri="{BB962C8B-B14F-4D97-AF65-F5344CB8AC3E}">
-        <p14:creationId xmlns="" xmlns:p14="http://schemas.microsoft.com/office/powerpoint/2010/main" val="2964279014"/>
+        <p14:creationId xmlns:p14="http://schemas.microsoft.com/office/powerpoint/2010/main" val="2964279014"/>
       </p:ext>
     </p:extLst>
   </p:cSld>
@@ -3816,7 +3883,7 @@
     </p:spTree>
     <p:extLst>
       <p:ext uri="{BB962C8B-B14F-4D97-AF65-F5344CB8AC3E}">
-        <p14:creationId xmlns="" xmlns:p14="http://schemas.microsoft.com/office/powerpoint/2010/main" val="1661936536"/>
+        <p14:creationId xmlns:p14="http://schemas.microsoft.com/office/powerpoint/2010/main" val="1661936536"/>
       </p:ext>
     </p:extLst>
   </p:cSld>
@@ -3888,6 +3955,166 @@
           <a:bodyPr/>
           <a:lstStyle/>
           <a:p>
+            <a:r>
+              <a:rPr lang="en-US" sz="1800" dirty="0"/>
+              <a:t>[</a:t>
+            </a:r>
+            <a:r>
+              <a:rPr lang="en-US" sz="1800" dirty="0" err="1"/>
+              <a:t>TestClass</a:t>
+            </a:r>
+            <a:r>
+              <a:rPr lang="en-US" sz="1800" dirty="0"/>
+              <a:t>]</a:t>
+            </a:r>
+          </a:p>
+          <a:p>
+            <a:r>
+              <a:rPr lang="en-US" sz="1800" dirty="0"/>
+              <a:t>    public class </a:t>
+            </a:r>
+            <a:r>
+              <a:rPr lang="en-US" sz="1800" dirty="0" err="1"/>
+              <a:t>ShipMovements</a:t>
+            </a:r>
+            <a:endParaRPr lang="en-US" sz="1800" dirty="0"/>
+          </a:p>
+          <a:p>
+            <a:r>
+              <a:rPr lang="en-US" sz="1800" dirty="0"/>
+              <a:t>    {</a:t>
+            </a:r>
+          </a:p>
+          <a:p>
+            <a:r>
+              <a:rPr lang="en-US" sz="1800" dirty="0"/>
+              <a:t>        </a:t>
+            </a:r>
+            <a:r>
+              <a:rPr lang="en-US" sz="1800" dirty="0" err="1"/>
+              <a:t>ActionScreen</a:t>
+            </a:r>
+            <a:r>
+              <a:rPr lang="en-US" sz="1800" dirty="0"/>
+              <a:t> </a:t>
+            </a:r>
+            <a:r>
+              <a:rPr lang="en-US" sz="1800" dirty="0" err="1"/>
+              <a:t>bckgnd</a:t>
+            </a:r>
+            <a:r>
+              <a:rPr lang="en-US" sz="1800" dirty="0"/>
+              <a:t> = new </a:t>
+            </a:r>
+            <a:r>
+              <a:rPr lang="en-US" sz="1800" dirty="0" err="1"/>
+              <a:t>ActionScreen</a:t>
+            </a:r>
+            <a:r>
+              <a:rPr lang="en-US" sz="1800" dirty="0"/>
+              <a:t>();</a:t>
+            </a:r>
+          </a:p>
+          <a:p>
+            <a:r>
+              <a:rPr lang="en-US" sz="1800" dirty="0"/>
+              <a:t>        Player p = new Player();</a:t>
+            </a:r>
+          </a:p>
+          <a:p>
+            <a:endParaRPr lang="en-US" sz="1800" dirty="0"/>
+          </a:p>
+          <a:p>
+            <a:r>
+              <a:rPr lang="en-US" sz="1800" dirty="0"/>
+              <a:t>        [</a:t>
+            </a:r>
+            <a:r>
+              <a:rPr lang="en-US" sz="1800" dirty="0" err="1"/>
+              <a:t>TestMethod</a:t>
+            </a:r>
+            <a:r>
+              <a:rPr lang="en-US" sz="1800" dirty="0"/>
+              <a:t>]</a:t>
+            </a:r>
+          </a:p>
+          <a:p>
+            <a:r>
+              <a:rPr lang="en-US" sz="1800" dirty="0"/>
+              <a:t>        public void </a:t>
+            </a:r>
+            <a:r>
+              <a:rPr lang="en-US" sz="1800" dirty="0" err="1"/>
+              <a:t>ShipMovingRight_Test</a:t>
+            </a:r>
+            <a:r>
+              <a:rPr lang="en-US" sz="1800" dirty="0"/>
+              <a:t>() //left is just like this one</a:t>
+            </a:r>
+          </a:p>
+          <a:p>
+            <a:r>
+              <a:rPr lang="en-US" sz="1800" dirty="0"/>
+              <a:t>        {</a:t>
+            </a:r>
+          </a:p>
+          <a:p>
+            <a:r>
+              <a:rPr lang="en-US" sz="1800" dirty="0"/>
+              <a:t>            </a:t>
+            </a:r>
+            <a:r>
+              <a:rPr lang="en-US" sz="1800" dirty="0" err="1"/>
+              <a:t>bckgnd.BackgroundOffset</a:t>
+            </a:r>
+            <a:r>
+              <a:rPr lang="en-US" sz="1800" dirty="0"/>
+              <a:t> = 0;</a:t>
+            </a:r>
+          </a:p>
+          <a:p>
+            <a:r>
+              <a:rPr lang="en-US" sz="1800" dirty="0"/>
+              <a:t>            </a:t>
+            </a:r>
+            <a:r>
+              <a:rPr lang="en-US" sz="1800" dirty="0" err="1"/>
+              <a:t>bckgnd.BackgroundOffset</a:t>
+            </a:r>
+            <a:r>
+              <a:rPr lang="en-US" sz="1800" dirty="0"/>
+              <a:t> += 1;</a:t>
+            </a:r>
+          </a:p>
+          <a:p>
+            <a:r>
+              <a:rPr lang="en-US" sz="1800" dirty="0"/>
+              <a:t>            </a:t>
+            </a:r>
+            <a:r>
+              <a:rPr lang="en-US" sz="1800" dirty="0" err="1"/>
+              <a:t>Assert.AreEqual</a:t>
+            </a:r>
+            <a:r>
+              <a:rPr lang="en-US" sz="1800" dirty="0"/>
+              <a:t>(1, </a:t>
+            </a:r>
+            <a:r>
+              <a:rPr lang="en-US" sz="1800" dirty="0" err="1"/>
+              <a:t>bckgnd.BackgroundOffset</a:t>
+            </a:r>
+            <a:r>
+              <a:rPr lang="en-US" sz="1800" dirty="0"/>
+              <a:t>);</a:t>
+            </a:r>
+          </a:p>
+          <a:p>
+            <a:r>
+              <a:rPr lang="en-US" sz="1800" dirty="0"/>
+              <a:t>        }</a:t>
+            </a:r>
+          </a:p>
+          <a:p>
             <a:pPr marL="0" indent="0">
               <a:buNone/>
             </a:pPr>
@@ -3898,7 +4125,7 @@
     </p:spTree>
     <p:extLst>
       <p:ext uri="{BB962C8B-B14F-4D97-AF65-F5344CB8AC3E}">
-        <p14:creationId xmlns="" xmlns:p14="http://schemas.microsoft.com/office/powerpoint/2010/main" val="3772113046"/>
+        <p14:creationId xmlns:p14="http://schemas.microsoft.com/office/powerpoint/2010/main" val="3772113046"/>
       </p:ext>
     </p:extLst>
   </p:cSld>
@@ -3949,7 +4176,7 @@
           <a:p>
             <a:r>
               <a:rPr lang="en-US" dirty="0" smtClean="0"/>
-              <a:t>Instructions Test Code</a:t>
+              <a:t>Ship Movement Test Code</a:t>
             </a:r>
             <a:endParaRPr lang="en-US" dirty="0"/>
           </a:p>
@@ -3970,6 +4197,99 @@
           <a:bodyPr/>
           <a:lstStyle/>
           <a:p>
+            <a:r>
+              <a:rPr lang="en-US" sz="1800" dirty="0"/>
+              <a:t> [</a:t>
+            </a:r>
+            <a:r>
+              <a:rPr lang="en-US" sz="1800" dirty="0" err="1"/>
+              <a:t>TestMethod</a:t>
+            </a:r>
+            <a:r>
+              <a:rPr lang="en-US" sz="1800" dirty="0"/>
+              <a:t>]</a:t>
+            </a:r>
+          </a:p>
+          <a:p>
+            <a:r>
+              <a:rPr lang="en-US" sz="1800" dirty="0"/>
+              <a:t>        public void </a:t>
+            </a:r>
+            <a:r>
+              <a:rPr lang="en-US" sz="1800" dirty="0" err="1"/>
+              <a:t>ShipMovingUp_Test</a:t>
+            </a:r>
+            <a:r>
+              <a:rPr lang="en-US" sz="1800" dirty="0"/>
+              <a:t>() // moving down test is just like it</a:t>
+            </a:r>
+          </a:p>
+          <a:p>
+            <a:r>
+              <a:rPr lang="en-US" sz="1800" dirty="0"/>
+              <a:t>        {</a:t>
+            </a:r>
+          </a:p>
+          <a:p>
+            <a:r>
+              <a:rPr lang="en-US" sz="1800" dirty="0"/>
+              <a:t>            </a:t>
+            </a:r>
+            <a:r>
+              <a:rPr lang="en-US" sz="1800" dirty="0" err="1"/>
+              <a:t>p.Y</a:t>
+            </a:r>
+            <a:r>
+              <a:rPr lang="en-US" sz="1800" dirty="0"/>
+              <a:t> = 0;</a:t>
+            </a:r>
+          </a:p>
+          <a:p>
+            <a:r>
+              <a:rPr lang="en-US" sz="1800" dirty="0"/>
+              <a:t>            </a:t>
+            </a:r>
+            <a:r>
+              <a:rPr lang="en-US" sz="1800" dirty="0" err="1"/>
+              <a:t>p.Y</a:t>
+            </a:r>
+            <a:r>
+              <a:rPr lang="en-US" sz="1800" dirty="0"/>
+              <a:t> += 1;</a:t>
+            </a:r>
+          </a:p>
+          <a:p>
+            <a:r>
+              <a:rPr lang="en-US" sz="1800" dirty="0"/>
+              <a:t>            </a:t>
+            </a:r>
+            <a:r>
+              <a:rPr lang="en-US" sz="1800" dirty="0" err="1"/>
+              <a:t>Assert.AreEqual</a:t>
+            </a:r>
+            <a:r>
+              <a:rPr lang="en-US" sz="1800" dirty="0"/>
+              <a:t>(1, </a:t>
+            </a:r>
+            <a:r>
+              <a:rPr lang="en-US" sz="1800" dirty="0" err="1"/>
+              <a:t>p.Y</a:t>
+            </a:r>
+            <a:r>
+              <a:rPr lang="en-US" sz="1800" dirty="0"/>
+              <a:t>);</a:t>
+            </a:r>
+          </a:p>
+          <a:p>
+            <a:r>
+              <a:rPr lang="en-US" sz="1800" dirty="0"/>
+              <a:t>        }</a:t>
+            </a:r>
+          </a:p>
+          <a:p>
+            <a:pPr marL="0" indent="0">
+              <a:buNone/>
+            </a:pPr>
             <a:endParaRPr lang="en-US" sz="1800" dirty="0"/>
           </a:p>
         </p:txBody>
@@ -3977,7 +4297,7 @@
     </p:spTree>
     <p:extLst>
       <p:ext uri="{BB962C8B-B14F-4D97-AF65-F5344CB8AC3E}">
-        <p14:creationId xmlns="" xmlns:p14="http://schemas.microsoft.com/office/powerpoint/2010/main" val="755878279"/>
+        <p14:creationId xmlns:p14="http://schemas.microsoft.com/office/powerpoint/2010/main" val="1101534859"/>
       </p:ext>
     </p:extLst>
   </p:cSld>
@@ -4028,7 +4348,7 @@
           <a:p>
             <a:r>
               <a:rPr lang="en-US" dirty="0" smtClean="0"/>
-              <a:t>Laser Test Code</a:t>
+              <a:t>Instructions Test Code</a:t>
             </a:r>
             <a:endParaRPr lang="en-US" dirty="0"/>
           </a:p>
@@ -4049,9 +4369,6 @@
           <a:bodyPr/>
           <a:lstStyle/>
           <a:p>
-            <a:pPr marL="0" indent="0">
-              <a:buNone/>
-            </a:pPr>
             <a:endParaRPr lang="en-US" sz="1800" dirty="0"/>
           </a:p>
         </p:txBody>
@@ -4059,7 +4376,7 @@
     </p:spTree>
     <p:extLst>
       <p:ext uri="{BB962C8B-B14F-4D97-AF65-F5344CB8AC3E}">
-        <p14:creationId xmlns="" xmlns:p14="http://schemas.microsoft.com/office/powerpoint/2010/main" val="755878279"/>
+        <p14:creationId xmlns:p14="http://schemas.microsoft.com/office/powerpoint/2010/main" val="755878279"/>
       </p:ext>
     </p:extLst>
   </p:cSld>
@@ -4110,7 +4427,7 @@
           <a:p>
             <a:r>
               <a:rPr lang="en-US" dirty="0" smtClean="0"/>
-              <a:t>Demo</a:t>
+              <a:t>Laser Test Code</a:t>
             </a:r>
             <a:endParaRPr lang="en-US" dirty="0"/>
           </a:p>
@@ -4118,7 +4435,7 @@
       </p:sp>
       <p:sp>
         <p:nvSpPr>
-          <p:cNvPr id="4" name="Content Placeholder 3"/>
+          <p:cNvPr id="3" name="Content Placeholder 2"/>
           <p:cNvSpPr>
             <a:spLocks noGrp="1"/>
           </p:cNvSpPr>
@@ -4131,11 +4448,19 @@
           <a:bodyPr/>
           <a:lstStyle/>
           <a:p>
-            <a:endParaRPr lang="en-US"/>
+            <a:pPr marL="0" indent="0">
+              <a:buNone/>
+            </a:pPr>
+            <a:endParaRPr lang="en-US" sz="1800" dirty="0"/>
           </a:p>
         </p:txBody>
       </p:sp>
     </p:spTree>
+    <p:extLst>
+      <p:ext uri="{BB962C8B-B14F-4D97-AF65-F5344CB8AC3E}">
+        <p14:creationId xmlns:p14="http://schemas.microsoft.com/office/powerpoint/2010/main" val="755878279"/>
+      </p:ext>
+    </p:extLst>
   </p:cSld>
   <p:clrMapOvr>
     <a:masterClrMapping/>
@@ -4184,7 +4509,7 @@
           <a:p>
             <a:r>
               <a:rPr lang="en-US" dirty="0" smtClean="0"/>
-              <a:t>Status of the Game</a:t>
+              <a:t>Demo</a:t>
             </a:r>
             <a:endParaRPr lang="en-US" dirty="0"/>
           </a:p>
@@ -4192,7 +4517,7 @@
       </p:sp>
       <p:sp>
         <p:nvSpPr>
-          <p:cNvPr id="3" name="Content Placeholder 2"/>
+          <p:cNvPr id="4" name="Content Placeholder 3"/>
           <p:cNvSpPr>
             <a:spLocks noGrp="1"/>
           </p:cNvSpPr>
@@ -4205,25 +4530,7 @@
           <a:bodyPr/>
           <a:lstStyle/>
           <a:p>
-            <a:r>
-              <a:rPr lang="en-US" dirty="0" smtClean="0"/>
-              <a:t>At this point all of the menu options except for high score are complete.</a:t>
-            </a:r>
-            <a:endParaRPr lang="en-US" dirty="0" smtClean="0"/>
-          </a:p>
-          <a:p>
-            <a:r>
-              <a:rPr lang="en-US" dirty="0" smtClean="0"/>
-              <a:t>The ship can move. The background is also set to auto scroll.</a:t>
-            </a:r>
-            <a:endParaRPr lang="en-US" dirty="0" smtClean="0"/>
-          </a:p>
-          <a:p>
-            <a:r>
-              <a:rPr lang="en-US" dirty="0" smtClean="0"/>
-              <a:t>The ship can now shoot a laser.</a:t>
-            </a:r>
-            <a:endParaRPr lang="en-US" dirty="0"/>
+            <a:endParaRPr lang="en-US"/>
           </a:p>
         </p:txBody>
       </p:sp>

</xml_diff>

<commit_message>
Updated Music Test Code
</commit_message>
<xml_diff>
--- a/Project Starfighter 1.1.pptx
+++ b/Project Starfighter 1.1.pptx
@@ -9,14 +9,15 @@
     <p:sldId id="258" r:id="rId3"/>
     <p:sldId id="279" r:id="rId4"/>
     <p:sldId id="274" r:id="rId5"/>
-    <p:sldId id="277" r:id="rId6"/>
-    <p:sldId id="285" r:id="rId7"/>
-    <p:sldId id="284" r:id="rId8"/>
-    <p:sldId id="286" r:id="rId9"/>
-    <p:sldId id="282" r:id="rId10"/>
-    <p:sldId id="269" r:id="rId11"/>
-    <p:sldId id="270" r:id="rId12"/>
-    <p:sldId id="271" r:id="rId13"/>
+    <p:sldId id="287" r:id="rId6"/>
+    <p:sldId id="277" r:id="rId7"/>
+    <p:sldId id="285" r:id="rId8"/>
+    <p:sldId id="284" r:id="rId9"/>
+    <p:sldId id="286" r:id="rId10"/>
+    <p:sldId id="282" r:id="rId11"/>
+    <p:sldId id="269" r:id="rId12"/>
+    <p:sldId id="270" r:id="rId13"/>
+    <p:sldId id="271" r:id="rId14"/>
   </p:sldIdLst>
   <p:sldSz cx="9144000" cy="6858000" type="screen4x3"/>
   <p:notesSz cx="6858000" cy="9144000"/>
@@ -3488,7 +3489,7 @@
           <a:p>
             <a:r>
               <a:rPr lang="en-US" dirty="0" smtClean="0"/>
-              <a:t>Demo</a:t>
+              <a:t>Laser Test Code</a:t>
             </a:r>
             <a:endParaRPr lang="en-US" dirty="0"/>
           </a:p>
@@ -3496,7 +3497,7 @@
       </p:sp>
       <p:sp>
         <p:nvSpPr>
-          <p:cNvPr id="4" name="Content Placeholder 3"/>
+          <p:cNvPr id="3" name="Content Placeholder 2"/>
           <p:cNvSpPr>
             <a:spLocks noGrp="1"/>
           </p:cNvSpPr>
@@ -3509,11 +3510,19 @@
           <a:bodyPr/>
           <a:lstStyle/>
           <a:p>
-            <a:endParaRPr lang="en-US"/>
+            <a:pPr marL="0" indent="0">
+              <a:buNone/>
+            </a:pPr>
+            <a:endParaRPr lang="en-US" sz="1800" dirty="0"/>
           </a:p>
         </p:txBody>
       </p:sp>
     </p:spTree>
+    <p:extLst>
+      <p:ext uri="{BB962C8B-B14F-4D97-AF65-F5344CB8AC3E}">
+        <p14:creationId xmlns="" xmlns:p14="http://schemas.microsoft.com/office/powerpoint/2010/main" val="755878279"/>
+      </p:ext>
+    </p:extLst>
   </p:cSld>
   <p:clrMapOvr>
     <a:masterClrMapping/>
@@ -3562,7 +3571,7 @@
           <a:p>
             <a:r>
               <a:rPr lang="en-US" dirty="0" smtClean="0"/>
-              <a:t>Status of the Game</a:t>
+              <a:t>Demo</a:t>
             </a:r>
             <a:endParaRPr lang="en-US" dirty="0"/>
           </a:p>
@@ -3570,7 +3579,7 @@
       </p:sp>
       <p:sp>
         <p:nvSpPr>
-          <p:cNvPr id="3" name="Content Placeholder 2"/>
+          <p:cNvPr id="4" name="Content Placeholder 3"/>
           <p:cNvSpPr>
             <a:spLocks noGrp="1"/>
           </p:cNvSpPr>
@@ -3583,23 +3592,7 @@
           <a:bodyPr/>
           <a:lstStyle/>
           <a:p>
-            <a:r>
-              <a:rPr lang="en-US" dirty="0" smtClean="0"/>
-              <a:t>At this point all of the menu options except for high score are complete.</a:t>
-            </a:r>
-          </a:p>
-          <a:p>
-            <a:r>
-              <a:rPr lang="en-US" dirty="0" smtClean="0"/>
-              <a:t>The ship can move. The background is also set to auto scroll.</a:t>
-            </a:r>
-          </a:p>
-          <a:p>
-            <a:r>
-              <a:rPr lang="en-US" dirty="0" smtClean="0"/>
-              <a:t>The ship can now shoot a laser.</a:t>
-            </a:r>
-            <a:endParaRPr lang="en-US" dirty="0"/>
+            <a:endParaRPr lang="en-US"/>
           </a:p>
         </p:txBody>
       </p:sp>
@@ -3652,6 +3645,96 @@
           <a:p>
             <a:r>
               <a:rPr lang="en-US" dirty="0" smtClean="0"/>
+              <a:t>Status of the Game</a:t>
+            </a:r>
+            <a:endParaRPr lang="en-US" dirty="0"/>
+          </a:p>
+        </p:txBody>
+      </p:sp>
+      <p:sp>
+        <p:nvSpPr>
+          <p:cNvPr id="3" name="Content Placeholder 2"/>
+          <p:cNvSpPr>
+            <a:spLocks noGrp="1"/>
+          </p:cNvSpPr>
+          <p:nvPr>
+            <p:ph idx="1"/>
+          </p:nvPr>
+        </p:nvSpPr>
+        <p:spPr/>
+        <p:txBody>
+          <a:bodyPr/>
+          <a:lstStyle/>
+          <a:p>
+            <a:r>
+              <a:rPr lang="en-US" dirty="0" smtClean="0"/>
+              <a:t>At this point all of the menu options except for high score are complete.</a:t>
+            </a:r>
+          </a:p>
+          <a:p>
+            <a:r>
+              <a:rPr lang="en-US" dirty="0" smtClean="0"/>
+              <a:t>The ship can move. The background is also set to auto scroll.</a:t>
+            </a:r>
+          </a:p>
+          <a:p>
+            <a:r>
+              <a:rPr lang="en-US" dirty="0" smtClean="0"/>
+              <a:t>The ship can now shoot a laser.</a:t>
+            </a:r>
+            <a:endParaRPr lang="en-US" dirty="0"/>
+          </a:p>
+        </p:txBody>
+      </p:sp>
+    </p:spTree>
+  </p:cSld>
+  <p:clrMapOvr>
+    <a:masterClrMapping/>
+  </p:clrMapOvr>
+  <p:timing>
+    <p:tnLst>
+      <p:par>
+        <p:cTn id="1" dur="indefinite" restart="never" nodeType="tmRoot"/>
+      </p:par>
+    </p:tnLst>
+  </p:timing>
+</p:sld>
+</file>
+
+<file path=ppt/slides/slide13.xml><?xml version="1.0" encoding="utf-8"?>
+<p:sld xmlns:a="http://schemas.openxmlformats.org/drawingml/2006/main" xmlns:r="http://schemas.openxmlformats.org/officeDocument/2006/relationships" xmlns:p="http://schemas.openxmlformats.org/presentationml/2006/main">
+  <p:cSld>
+    <p:spTree>
+      <p:nvGrpSpPr>
+        <p:cNvPr id="1" name=""/>
+        <p:cNvGrpSpPr/>
+        <p:nvPr/>
+      </p:nvGrpSpPr>
+      <p:grpSpPr>
+        <a:xfrm>
+          <a:off x="0" y="0"/>
+          <a:ext cx="0" cy="0"/>
+          <a:chOff x="0" y="0"/>
+          <a:chExt cx="0" cy="0"/>
+        </a:xfrm>
+      </p:grpSpPr>
+      <p:sp>
+        <p:nvSpPr>
+          <p:cNvPr id="2" name="Title 1"/>
+          <p:cNvSpPr>
+            <a:spLocks noGrp="1"/>
+          </p:cNvSpPr>
+          <p:nvPr>
+            <p:ph type="title"/>
+          </p:nvPr>
+        </p:nvSpPr>
+        <p:spPr/>
+        <p:txBody>
+          <a:bodyPr/>
+          <a:lstStyle/>
+          <a:p>
+            <a:r>
+              <a:rPr lang="en-US" dirty="0" smtClean="0"/>
               <a:t>Plans for version 1.2</a:t>
             </a:r>
             <a:endParaRPr lang="en-US" dirty="0"/>
@@ -3873,6 +3956,186 @@
           <a:bodyPr/>
           <a:lstStyle/>
           <a:p>
+            <a:r>
+              <a:rPr lang="en-US" sz="2000" dirty="0" smtClean="0"/>
+              <a:t> </a:t>
+            </a:r>
+            <a:r>
+              <a:rPr lang="en-US" sz="2000" dirty="0" err="1" smtClean="0"/>
+              <a:t>boolean</a:t>
+            </a:r>
+            <a:r>
+              <a:rPr lang="en-US" sz="2000" dirty="0" smtClean="0"/>
+              <a:t> </a:t>
+            </a:r>
+            <a:r>
+              <a:rPr lang="en-US" sz="2000" dirty="0" err="1" smtClean="0"/>
+              <a:t>startMenuSong</a:t>
+            </a:r>
+            <a:r>
+              <a:rPr lang="en-US" sz="2000" dirty="0" smtClean="0"/>
+              <a:t> = </a:t>
+            </a:r>
+            <a:r>
+              <a:rPr lang="en-US" sz="2000" dirty="0" smtClean="0"/>
+              <a:t>true;</a:t>
+            </a:r>
+            <a:endParaRPr lang="en-US" sz="2000" dirty="0" smtClean="0"/>
+          </a:p>
+          <a:p>
+            <a:r>
+              <a:rPr lang="en-US" sz="2000" dirty="0" smtClean="0"/>
+              <a:t> </a:t>
+            </a:r>
+            <a:r>
+              <a:rPr lang="en-US" sz="2000" dirty="0" err="1" smtClean="0"/>
+              <a:t>boolean</a:t>
+            </a:r>
+            <a:r>
+              <a:rPr lang="en-US" sz="2000" dirty="0" smtClean="0"/>
+              <a:t> </a:t>
+            </a:r>
+            <a:r>
+              <a:rPr lang="en-US" sz="2000" dirty="0" err="1" smtClean="0"/>
+              <a:t>LevelOneSong</a:t>
+            </a:r>
+            <a:r>
+              <a:rPr lang="en-US" sz="2000" dirty="0" smtClean="0"/>
+              <a:t> = false;</a:t>
+            </a:r>
+            <a:r>
+              <a:rPr lang="en-US" sz="2000" dirty="0" smtClean="0"/>
+              <a:t> </a:t>
+            </a:r>
+          </a:p>
+          <a:p>
+            <a:endParaRPr lang="en-US" sz="2000" dirty="0" smtClean="0"/>
+          </a:p>
+          <a:p>
+            <a:r>
+              <a:rPr lang="en-US" sz="2000" dirty="0" smtClean="0"/>
+              <a:t>[</a:t>
+            </a:r>
+            <a:r>
+              <a:rPr lang="en-US" sz="2000" dirty="0" err="1" smtClean="0"/>
+              <a:t>TestMethod</a:t>
+            </a:r>
+            <a:r>
+              <a:rPr lang="en-US" sz="2000" dirty="0" smtClean="0"/>
+              <a:t>]</a:t>
+            </a:r>
+          </a:p>
+          <a:p>
+            <a:r>
+              <a:rPr lang="en-US" sz="2000" dirty="0" smtClean="0"/>
+              <a:t>        public void </a:t>
+            </a:r>
+            <a:r>
+              <a:rPr lang="en-US" sz="2000" dirty="0" err="1" smtClean="0"/>
+              <a:t>Test_Load</a:t>
+            </a:r>
+            <a:r>
+              <a:rPr lang="en-US" sz="2000" dirty="0" smtClean="0"/>
+              <a:t>()</a:t>
+            </a:r>
+          </a:p>
+          <a:p>
+            <a:r>
+              <a:rPr lang="en-US" sz="2000" dirty="0" smtClean="0"/>
+              <a:t>        {</a:t>
+            </a:r>
+          </a:p>
+          <a:p>
+            <a:r>
+              <a:rPr lang="en-US" sz="2000" dirty="0" smtClean="0"/>
+              <a:t>            string </a:t>
+            </a:r>
+            <a:r>
+              <a:rPr lang="en-US" sz="2000" dirty="0" err="1" smtClean="0"/>
+              <a:t>songlocation</a:t>
+            </a:r>
+            <a:r>
+              <a:rPr lang="en-US" sz="2000" dirty="0" smtClean="0"/>
+              <a:t> = "Menu";</a:t>
+            </a:r>
+          </a:p>
+          <a:p>
+            <a:r>
+              <a:rPr lang="en-US" sz="2000" dirty="0" smtClean="0"/>
+              <a:t>            </a:t>
+            </a:r>
+            <a:r>
+              <a:rPr lang="en-US" sz="2000" dirty="0" err="1" smtClean="0"/>
+              <a:t>Assert.IsNotNull</a:t>
+            </a:r>
+            <a:r>
+              <a:rPr lang="en-US" sz="2000" dirty="0" smtClean="0"/>
+              <a:t>(</a:t>
+            </a:r>
+            <a:r>
+              <a:rPr lang="en-US" sz="2000" dirty="0" err="1" smtClean="0"/>
+              <a:t>songlocation</a:t>
+            </a:r>
+            <a:r>
+              <a:rPr lang="en-US" sz="2000" dirty="0" smtClean="0"/>
+              <a:t>);</a:t>
+            </a:r>
+          </a:p>
+          <a:p>
+            <a:r>
+              <a:rPr lang="en-US" sz="2000" dirty="0" smtClean="0"/>
+              <a:t> </a:t>
+            </a:r>
+          </a:p>
+          <a:p>
+            <a:r>
+              <a:rPr lang="en-US" sz="2000" dirty="0" smtClean="0"/>
+              <a:t>            </a:t>
+            </a:r>
+            <a:r>
+              <a:rPr lang="en-US" sz="2000" dirty="0" err="1" smtClean="0"/>
+              <a:t>bool</a:t>
+            </a:r>
+            <a:r>
+              <a:rPr lang="en-US" sz="2000" dirty="0" smtClean="0"/>
+              <a:t> </a:t>
+            </a:r>
+            <a:r>
+              <a:rPr lang="en-US" sz="2000" dirty="0" err="1" smtClean="0"/>
+              <a:t>repeatSong</a:t>
+            </a:r>
+            <a:r>
+              <a:rPr lang="en-US" sz="2000" dirty="0" smtClean="0"/>
+              <a:t> = true;</a:t>
+            </a:r>
+          </a:p>
+          <a:p>
+            <a:r>
+              <a:rPr lang="en-US" sz="2000" dirty="0" smtClean="0"/>
+              <a:t>            </a:t>
+            </a:r>
+            <a:r>
+              <a:rPr lang="en-US" sz="2000" dirty="0" err="1" smtClean="0"/>
+              <a:t>Assert.IsTrue</a:t>
+            </a:r>
+            <a:r>
+              <a:rPr lang="en-US" sz="2000" dirty="0" smtClean="0"/>
+              <a:t>(</a:t>
+            </a:r>
+            <a:r>
+              <a:rPr lang="en-US" sz="2000" dirty="0" err="1" smtClean="0"/>
+              <a:t>repeatSong</a:t>
+            </a:r>
+            <a:r>
+              <a:rPr lang="en-US" sz="2000" dirty="0" smtClean="0"/>
+              <a:t>);</a:t>
+            </a:r>
+          </a:p>
+          <a:p>
+            <a:r>
+              <a:rPr lang="en-US" sz="2000" dirty="0" smtClean="0"/>
+              <a:t>}</a:t>
+            </a:r>
             <a:endParaRPr lang="en-US" sz="2000" dirty="0"/>
           </a:p>
         </p:txBody>
@@ -3880,7 +4143,7 @@
     </p:spTree>
     <p:extLst>
       <p:ext uri="{BB962C8B-B14F-4D97-AF65-F5344CB8AC3E}">
-        <p14:creationId xmlns:p14="http://schemas.microsoft.com/office/powerpoint/2010/main" xmlns="" val="2964279014"/>
+        <p14:creationId xmlns="" xmlns:p14="http://schemas.microsoft.com/office/powerpoint/2010/main" val="2964279014"/>
       </p:ext>
     </p:extLst>
   </p:cSld>
@@ -3948,17 +4211,112 @@
           <a:bodyPr/>
           <a:lstStyle/>
           <a:p>
-            <a:pPr>
-              <a:buNone/>
-            </a:pPr>
-            <a:endParaRPr lang="en-US" sz="2000" dirty="0"/>
+            <a:r>
+              <a:rPr lang="en-US" sz="2000" dirty="0" smtClean="0"/>
+              <a:t> [</a:t>
+            </a:r>
+            <a:r>
+              <a:rPr lang="en-US" sz="2000" dirty="0" err="1" smtClean="0"/>
+              <a:t>TestMethod</a:t>
+            </a:r>
+            <a:r>
+              <a:rPr lang="en-US" sz="2000" dirty="0" smtClean="0"/>
+              <a:t>]</a:t>
+            </a:r>
+          </a:p>
+          <a:p>
+            <a:r>
+              <a:rPr lang="en-US" sz="2000" dirty="0" smtClean="0"/>
+              <a:t>        public void </a:t>
+            </a:r>
+            <a:r>
+              <a:rPr lang="en-US" sz="2000" dirty="0" err="1" smtClean="0"/>
+              <a:t>HandleStartScreen_Test</a:t>
+            </a:r>
+            <a:r>
+              <a:rPr lang="en-US" sz="2000" dirty="0" smtClean="0"/>
+              <a:t>()</a:t>
+            </a:r>
+          </a:p>
+          <a:p>
+            <a:r>
+              <a:rPr lang="en-US" sz="2000" dirty="0" smtClean="0"/>
+              <a:t>        {</a:t>
+            </a:r>
+          </a:p>
+          <a:p>
+            <a:r>
+              <a:rPr lang="en-US" sz="2000" dirty="0" smtClean="0"/>
+              <a:t>            </a:t>
+            </a:r>
+            <a:r>
+              <a:rPr lang="en-US" sz="2000" dirty="0" err="1" smtClean="0"/>
+              <a:t>Assert.istrue</a:t>
+            </a:r>
+            <a:r>
+              <a:rPr lang="en-US" sz="2000" dirty="0" smtClean="0"/>
+              <a:t>(</a:t>
+            </a:r>
+            <a:r>
+              <a:rPr lang="en-US" sz="2000" dirty="0" err="1" smtClean="0"/>
+              <a:t>startMenuSong</a:t>
+            </a:r>
+            <a:r>
+              <a:rPr lang="en-US" sz="2000" dirty="0" smtClean="0"/>
+              <a:t>);</a:t>
+            </a:r>
+          </a:p>
+          <a:p>
+            <a:r>
+              <a:rPr lang="en-US" sz="2000" dirty="0" smtClean="0"/>
+              <a:t>            </a:t>
+            </a:r>
+            <a:r>
+              <a:rPr lang="en-US" sz="2000" dirty="0" err="1" smtClean="0"/>
+              <a:t>startMenuSong</a:t>
+            </a:r>
+            <a:r>
+              <a:rPr lang="en-US" sz="2000" dirty="0" smtClean="0"/>
+              <a:t> = false;</a:t>
+            </a:r>
+          </a:p>
+          <a:p>
+            <a:r>
+              <a:rPr lang="en-US" sz="2000" dirty="0" smtClean="0"/>
+              <a:t>            </a:t>
+            </a:r>
+            <a:r>
+              <a:rPr lang="en-US" sz="2000" dirty="0" err="1" smtClean="0"/>
+              <a:t>Assert.IsFalse</a:t>
+            </a:r>
+            <a:r>
+              <a:rPr lang="en-US" sz="2000" dirty="0" smtClean="0"/>
+              <a:t>(</a:t>
+            </a:r>
+            <a:r>
+              <a:rPr lang="en-US" sz="2000" dirty="0" err="1" smtClean="0"/>
+              <a:t>startMenuSong</a:t>
+            </a:r>
+            <a:r>
+              <a:rPr lang="en-US" sz="2000" dirty="0" smtClean="0"/>
+              <a:t>);</a:t>
+            </a:r>
+          </a:p>
+          <a:p>
+            <a:r>
+              <a:rPr lang="en-US" sz="2000" dirty="0" smtClean="0"/>
+              <a:t>        }</a:t>
+            </a:r>
+          </a:p>
+          <a:p>
+            <a:endParaRPr lang="en-US" sz="2000" dirty="0" smtClean="0"/>
           </a:p>
         </p:txBody>
       </p:sp>
     </p:spTree>
     <p:extLst>
       <p:ext uri="{BB962C8B-B14F-4D97-AF65-F5344CB8AC3E}">
-        <p14:creationId xmlns:p14="http://schemas.microsoft.com/office/powerpoint/2010/main" xmlns="" val="1661936536"/>
+        <p14:creationId xmlns="" xmlns:p14="http://schemas.microsoft.com/office/powerpoint/2010/main" val="1661936536"/>
       </p:ext>
     </p:extLst>
   </p:cSld>
@@ -4007,213 +4365,166 @@
           <a:bodyPr/>
           <a:lstStyle/>
           <a:p>
+            <a:endParaRPr lang="en-US"/>
+          </a:p>
+        </p:txBody>
+      </p:sp>
+      <p:sp>
+        <p:nvSpPr>
+          <p:cNvPr id="3" name="Content Placeholder 2"/>
+          <p:cNvSpPr>
+            <a:spLocks noGrp="1"/>
+          </p:cNvSpPr>
+          <p:nvPr>
+            <p:ph idx="1"/>
+          </p:nvPr>
+        </p:nvSpPr>
+        <p:spPr/>
+        <p:txBody>
+          <a:bodyPr/>
+          <a:lstStyle/>
+          <a:p>
             <a:r>
               <a:rPr lang="en-US" dirty="0" smtClean="0"/>
-              <a:t>Ship Movement Test Code</a:t>
+              <a:t> [</a:t>
+            </a:r>
+            <a:r>
+              <a:rPr lang="en-US" dirty="0" err="1" smtClean="0"/>
+              <a:t>TestMethod</a:t>
+            </a:r>
+            <a:r>
+              <a:rPr lang="en-US" dirty="0" smtClean="0"/>
+              <a:t>]</a:t>
+            </a:r>
+          </a:p>
+          <a:p>
+            <a:r>
+              <a:rPr lang="en-US" dirty="0" smtClean="0"/>
+              <a:t>        public void </a:t>
+            </a:r>
+            <a:r>
+              <a:rPr lang="en-US" dirty="0" err="1" smtClean="0"/>
+              <a:t>HandleActionScreen_Test</a:t>
+            </a:r>
+            <a:r>
+              <a:rPr lang="en-US" dirty="0" smtClean="0"/>
+              <a:t>()</a:t>
+            </a:r>
+          </a:p>
+          <a:p>
+            <a:r>
+              <a:rPr lang="en-US" dirty="0" smtClean="0"/>
+              <a:t>        {</a:t>
+            </a:r>
+          </a:p>
+          <a:p>
+            <a:r>
+              <a:rPr lang="en-US" dirty="0" smtClean="0"/>
+              <a:t>            </a:t>
+            </a:r>
+            <a:r>
+              <a:rPr lang="en-US" dirty="0" err="1" smtClean="0"/>
+              <a:t>Assert.IsFalse</a:t>
+            </a:r>
+            <a:r>
+              <a:rPr lang="en-US" dirty="0" smtClean="0"/>
+              <a:t>(</a:t>
+            </a:r>
+            <a:r>
+              <a:rPr lang="en-US" dirty="0" err="1" smtClean="0"/>
+              <a:t>startLevelOneSong</a:t>
+            </a:r>
+            <a:r>
+              <a:rPr lang="en-US" dirty="0" smtClean="0"/>
+              <a:t>);</a:t>
+            </a:r>
+          </a:p>
+          <a:p>
+            <a:r>
+              <a:rPr lang="en-US" dirty="0" smtClean="0"/>
+              <a:t>            </a:t>
+            </a:r>
+            <a:r>
+              <a:rPr lang="en-US" dirty="0" err="1" smtClean="0"/>
+              <a:t>startLevelOneSong</a:t>
+            </a:r>
+            <a:r>
+              <a:rPr lang="en-US" dirty="0" smtClean="0"/>
+              <a:t> = true;</a:t>
+            </a:r>
+          </a:p>
+          <a:p>
+            <a:r>
+              <a:rPr lang="en-US" dirty="0" smtClean="0"/>
+              <a:t>            </a:t>
+            </a:r>
+            <a:r>
+              <a:rPr lang="en-US" dirty="0" err="1" smtClean="0"/>
+              <a:t>Assert.IsTrue</a:t>
+            </a:r>
+            <a:r>
+              <a:rPr lang="en-US" dirty="0" smtClean="0"/>
+              <a:t>(</a:t>
+            </a:r>
+            <a:r>
+              <a:rPr lang="en-US" dirty="0" err="1" smtClean="0"/>
+              <a:t>startMenuSong</a:t>
+            </a:r>
+            <a:r>
+              <a:rPr lang="en-US" dirty="0" smtClean="0"/>
+              <a:t>);</a:t>
+            </a:r>
+          </a:p>
+          <a:p>
+            <a:r>
+              <a:rPr lang="en-US" dirty="0" smtClean="0"/>
+              <a:t>            </a:t>
+            </a:r>
+            <a:r>
+              <a:rPr lang="en-US" dirty="0" err="1" smtClean="0"/>
+              <a:t>startLevelOneSong</a:t>
+            </a:r>
+            <a:r>
+              <a:rPr lang="en-US" dirty="0" smtClean="0"/>
+              <a:t> = false;</a:t>
+            </a:r>
+          </a:p>
+          <a:p>
+            <a:r>
+              <a:rPr lang="en-US" dirty="0" smtClean="0"/>
+              <a:t>            </a:t>
+            </a:r>
+            <a:r>
+              <a:rPr lang="en-US" dirty="0" err="1" smtClean="0"/>
+              <a:t>Assert.IsFalse</a:t>
+            </a:r>
+            <a:r>
+              <a:rPr lang="en-US" dirty="0" smtClean="0"/>
+              <a:t>(</a:t>
+            </a:r>
+            <a:r>
+              <a:rPr lang="en-US" dirty="0" err="1" smtClean="0"/>
+              <a:t>startLevelOneSong</a:t>
+            </a:r>
+            <a:r>
+              <a:rPr lang="en-US" dirty="0" smtClean="0"/>
+              <a:t>);</a:t>
+            </a:r>
+          </a:p>
+          <a:p>
+            <a:r>
+              <a:rPr lang="en-US" dirty="0" smtClean="0"/>
+              <a:t>        }</a:t>
             </a:r>
             <a:endParaRPr lang="en-US" dirty="0"/>
           </a:p>
         </p:txBody>
       </p:sp>
-      <p:sp>
-        <p:nvSpPr>
-          <p:cNvPr id="3" name="Content Placeholder 2"/>
-          <p:cNvSpPr>
-            <a:spLocks noGrp="1"/>
-          </p:cNvSpPr>
-          <p:nvPr>
-            <p:ph idx="1"/>
-          </p:nvPr>
-        </p:nvSpPr>
-        <p:spPr/>
-        <p:txBody>
-          <a:bodyPr/>
-          <a:lstStyle/>
-          <a:p>
-            <a:r>
-              <a:rPr lang="en-US" sz="1800" dirty="0"/>
-              <a:t>[</a:t>
-            </a:r>
-            <a:r>
-              <a:rPr lang="en-US" sz="1800" dirty="0" err="1"/>
-              <a:t>TestClass</a:t>
-            </a:r>
-            <a:r>
-              <a:rPr lang="en-US" sz="1800" dirty="0"/>
-              <a:t>]</a:t>
-            </a:r>
-          </a:p>
-          <a:p>
-            <a:r>
-              <a:rPr lang="en-US" sz="1800" dirty="0"/>
-              <a:t>    public class </a:t>
-            </a:r>
-            <a:r>
-              <a:rPr lang="en-US" sz="1800" dirty="0" err="1"/>
-              <a:t>ShipMovements</a:t>
-            </a:r>
-            <a:endParaRPr lang="en-US" sz="1800" dirty="0"/>
-          </a:p>
-          <a:p>
-            <a:r>
-              <a:rPr lang="en-US" sz="1800" dirty="0"/>
-              <a:t>    {</a:t>
-            </a:r>
-          </a:p>
-          <a:p>
-            <a:r>
-              <a:rPr lang="en-US" sz="1800" dirty="0"/>
-              <a:t>        </a:t>
-            </a:r>
-            <a:r>
-              <a:rPr lang="en-US" sz="1800" dirty="0" err="1"/>
-              <a:t>ActionScreen</a:t>
-            </a:r>
-            <a:r>
-              <a:rPr lang="en-US" sz="1800" dirty="0"/>
-              <a:t> </a:t>
-            </a:r>
-            <a:r>
-              <a:rPr lang="en-US" sz="1800" dirty="0" err="1"/>
-              <a:t>bckgnd</a:t>
-            </a:r>
-            <a:r>
-              <a:rPr lang="en-US" sz="1800" dirty="0"/>
-              <a:t> = new </a:t>
-            </a:r>
-            <a:r>
-              <a:rPr lang="en-US" sz="1800" dirty="0" err="1"/>
-              <a:t>ActionScreen</a:t>
-            </a:r>
-            <a:r>
-              <a:rPr lang="en-US" sz="1800" dirty="0"/>
-              <a:t>();</a:t>
-            </a:r>
-          </a:p>
-          <a:p>
-            <a:r>
-              <a:rPr lang="en-US" sz="1800" dirty="0"/>
-              <a:t>        Player p = new Player();</a:t>
-            </a:r>
-          </a:p>
-          <a:p>
-            <a:endParaRPr lang="en-US" sz="1800" dirty="0"/>
-          </a:p>
-          <a:p>
-            <a:r>
-              <a:rPr lang="en-US" sz="1800" dirty="0"/>
-              <a:t>        [</a:t>
-            </a:r>
-            <a:r>
-              <a:rPr lang="en-US" sz="1800" dirty="0" err="1"/>
-              <a:t>TestMethod</a:t>
-            </a:r>
-            <a:r>
-              <a:rPr lang="en-US" sz="1800" dirty="0"/>
-              <a:t>]</a:t>
-            </a:r>
-          </a:p>
-          <a:p>
-            <a:r>
-              <a:rPr lang="en-US" sz="1800" dirty="0"/>
-              <a:t>        public void </a:t>
-            </a:r>
-            <a:r>
-              <a:rPr lang="en-US" sz="1800" dirty="0" err="1"/>
-              <a:t>ShipMovingRight_Test</a:t>
-            </a:r>
-            <a:r>
-              <a:rPr lang="en-US" sz="1800" dirty="0"/>
-              <a:t>() //left is just like this one</a:t>
-            </a:r>
-          </a:p>
-          <a:p>
-            <a:r>
-              <a:rPr lang="en-US" sz="1800" dirty="0"/>
-              <a:t>        {</a:t>
-            </a:r>
-          </a:p>
-          <a:p>
-            <a:r>
-              <a:rPr lang="en-US" sz="1800" dirty="0"/>
-              <a:t>            </a:t>
-            </a:r>
-            <a:r>
-              <a:rPr lang="en-US" sz="1800" dirty="0" err="1"/>
-              <a:t>bckgnd.BackgroundOffset</a:t>
-            </a:r>
-            <a:r>
-              <a:rPr lang="en-US" sz="1800" dirty="0"/>
-              <a:t> = 0;</a:t>
-            </a:r>
-          </a:p>
-          <a:p>
-            <a:r>
-              <a:rPr lang="en-US" sz="1800" dirty="0"/>
-              <a:t>            </a:t>
-            </a:r>
-            <a:r>
-              <a:rPr lang="en-US" sz="1800" dirty="0" err="1"/>
-              <a:t>bckgnd.BackgroundOffset</a:t>
-            </a:r>
-            <a:r>
-              <a:rPr lang="en-US" sz="1800" dirty="0"/>
-              <a:t> += 1;</a:t>
-            </a:r>
-          </a:p>
-          <a:p>
-            <a:r>
-              <a:rPr lang="en-US" sz="1800" dirty="0"/>
-              <a:t>            </a:t>
-            </a:r>
-            <a:r>
-              <a:rPr lang="en-US" sz="1800" dirty="0" err="1"/>
-              <a:t>Assert.AreEqual</a:t>
-            </a:r>
-            <a:r>
-              <a:rPr lang="en-US" sz="1800" dirty="0"/>
-              <a:t>(1, </a:t>
-            </a:r>
-            <a:r>
-              <a:rPr lang="en-US" sz="1800" dirty="0" err="1"/>
-              <a:t>bckgnd.BackgroundOffset</a:t>
-            </a:r>
-            <a:r>
-              <a:rPr lang="en-US" sz="1800" dirty="0"/>
-              <a:t>);</a:t>
-            </a:r>
-          </a:p>
-          <a:p>
-            <a:r>
-              <a:rPr lang="en-US" sz="1800" dirty="0"/>
-              <a:t>        }</a:t>
-            </a:r>
-          </a:p>
-          <a:p>
-            <a:pPr marL="0" indent="0">
-              <a:buNone/>
-            </a:pPr>
-            <a:endParaRPr lang="en-US" sz="1800" dirty="0"/>
-          </a:p>
-        </p:txBody>
-      </p:sp>
     </p:spTree>
-    <p:extLst>
-      <p:ext uri="{BB962C8B-B14F-4D97-AF65-F5344CB8AC3E}">
-        <p14:creationId xmlns:p14="http://schemas.microsoft.com/office/powerpoint/2010/main" xmlns="" val="3772113046"/>
-      </p:ext>
-    </p:extLst>
   </p:cSld>
   <p:clrMapOvr>
     <a:masterClrMapping/>
   </p:clrMapOvr>
-  <p:timing>
-    <p:tnLst>
-      <p:par>
-        <p:cTn id="1" dur="indefinite" restart="never" nodeType="tmRoot"/>
-      </p:par>
-    </p:tnLst>
-  </p:timing>
 </p:sld>
 </file>
 
@@ -4251,11 +4562,7 @@
           <a:p>
             <a:r>
               <a:rPr lang="en-US" dirty="0" smtClean="0"/>
-              <a:t>Ship Movement Test </a:t>
-            </a:r>
-            <a:r>
-              <a:rPr lang="en-US" dirty="0" smtClean="0"/>
-              <a:t>Code (cont)</a:t>
+              <a:t>Ship Movement Test Code</a:t>
             </a:r>
             <a:endParaRPr lang="en-US" dirty="0"/>
           </a:p>
@@ -4278,7 +4585,77 @@
           <a:p>
             <a:r>
               <a:rPr lang="en-US" sz="1800" dirty="0"/>
-              <a:t> [</a:t>
+              <a:t>[</a:t>
+            </a:r>
+            <a:r>
+              <a:rPr lang="en-US" sz="1800" dirty="0" err="1"/>
+              <a:t>TestClass</a:t>
+            </a:r>
+            <a:r>
+              <a:rPr lang="en-US" sz="1800" dirty="0"/>
+              <a:t>]</a:t>
+            </a:r>
+          </a:p>
+          <a:p>
+            <a:r>
+              <a:rPr lang="en-US" sz="1800" dirty="0"/>
+              <a:t>    public class </a:t>
+            </a:r>
+            <a:r>
+              <a:rPr lang="en-US" sz="1800" dirty="0" err="1"/>
+              <a:t>ShipMovements</a:t>
+            </a:r>
+            <a:endParaRPr lang="en-US" sz="1800" dirty="0"/>
+          </a:p>
+          <a:p>
+            <a:r>
+              <a:rPr lang="en-US" sz="1800" dirty="0"/>
+              <a:t>    {</a:t>
+            </a:r>
+          </a:p>
+          <a:p>
+            <a:r>
+              <a:rPr lang="en-US" sz="1800" dirty="0"/>
+              <a:t>        </a:t>
+            </a:r>
+            <a:r>
+              <a:rPr lang="en-US" sz="1800" dirty="0" err="1"/>
+              <a:t>ActionScreen</a:t>
+            </a:r>
+            <a:r>
+              <a:rPr lang="en-US" sz="1800" dirty="0"/>
+              <a:t> </a:t>
+            </a:r>
+            <a:r>
+              <a:rPr lang="en-US" sz="1800" dirty="0" err="1"/>
+              <a:t>bckgnd</a:t>
+            </a:r>
+            <a:r>
+              <a:rPr lang="en-US" sz="1800" dirty="0"/>
+              <a:t> = new </a:t>
+            </a:r>
+            <a:r>
+              <a:rPr lang="en-US" sz="1800" dirty="0" err="1"/>
+              <a:t>ActionScreen</a:t>
+            </a:r>
+            <a:r>
+              <a:rPr lang="en-US" sz="1800" dirty="0"/>
+              <a:t>();</a:t>
+            </a:r>
+          </a:p>
+          <a:p>
+            <a:r>
+              <a:rPr lang="en-US" sz="1800" dirty="0"/>
+              <a:t>        Player p = new Player();</a:t>
+            </a:r>
+          </a:p>
+          <a:p>
+            <a:endParaRPr lang="en-US" sz="1800" dirty="0"/>
+          </a:p>
+          <a:p>
+            <a:r>
+              <a:rPr lang="en-US" sz="1800" dirty="0"/>
+              <a:t>        [</a:t>
             </a:r>
             <a:r>
               <a:rPr lang="en-US" sz="1800" dirty="0" err="1"/>
@@ -4296,11 +4673,11 @@
             </a:r>
             <a:r>
               <a:rPr lang="en-US" sz="1800" dirty="0" err="1"/>
-              <a:t>ShipMovingUp_Test</a:t>
+              <a:t>ShipMovingRight_Test</a:t>
             </a:r>
             <a:r>
               <a:rPr lang="en-US" sz="1800" dirty="0"/>
-              <a:t>() // moving down test is just like it</a:t>
+              <a:t>() //left is just like this one</a:t>
             </a:r>
           </a:p>
           <a:p>
@@ -4316,7 +4693,7 @@
             </a:r>
             <a:r>
               <a:rPr lang="en-US" sz="1800" dirty="0" err="1"/>
-              <a:t>p.Y</a:t>
+              <a:t>bckgnd.BackgroundOffset</a:t>
             </a:r>
             <a:r>
               <a:rPr lang="en-US" sz="1800" dirty="0"/>
@@ -4330,7 +4707,7 @@
             </a:r>
             <a:r>
               <a:rPr lang="en-US" sz="1800" dirty="0" err="1"/>
-              <a:t>p.Y</a:t>
+              <a:t>bckgnd.BackgroundOffset</a:t>
             </a:r>
             <a:r>
               <a:rPr lang="en-US" sz="1800" dirty="0"/>
@@ -4352,7 +4729,7 @@
             </a:r>
             <a:r>
               <a:rPr lang="en-US" sz="1800" dirty="0" err="1"/>
-              <a:t>p.Y</a:t>
+              <a:t>bckgnd.BackgroundOffset</a:t>
             </a:r>
             <a:r>
               <a:rPr lang="en-US" sz="1800" dirty="0"/>
@@ -4376,7 +4753,7 @@
     </p:spTree>
     <p:extLst>
       <p:ext uri="{BB962C8B-B14F-4D97-AF65-F5344CB8AC3E}">
-        <p14:creationId xmlns:p14="http://schemas.microsoft.com/office/powerpoint/2010/main" xmlns="" val="1101534859"/>
+        <p14:creationId xmlns="" xmlns:p14="http://schemas.microsoft.com/office/powerpoint/2010/main" val="3772113046"/>
       </p:ext>
     </p:extLst>
   </p:cSld>
@@ -4427,7 +4804,7 @@
           <a:p>
             <a:r>
               <a:rPr lang="en-US" dirty="0" smtClean="0"/>
-              <a:t>Instructions Test Code</a:t>
+              <a:t>Ship Movement Test Code (cont)</a:t>
             </a:r>
             <a:endParaRPr lang="en-US" dirty="0"/>
           </a:p>
@@ -4443,224 +4820,104 @@
             <p:ph idx="1"/>
           </p:nvPr>
         </p:nvSpPr>
-        <p:spPr>
-          <a:xfrm>
-            <a:off x="457200" y="1219200"/>
-            <a:ext cx="8229600" cy="5410200"/>
-          </a:xfrm>
-        </p:spPr>
+        <p:spPr/>
         <p:txBody>
           <a:bodyPr/>
           <a:lstStyle/>
           <a:p>
             <a:r>
-              <a:rPr lang="en-US" sz="1800" dirty="0" smtClean="0"/>
-              <a:t>[</a:t>
-            </a:r>
-            <a:r>
-              <a:rPr lang="en-US" sz="1800" dirty="0" err="1" smtClean="0"/>
-              <a:t>TestClass</a:t>
-            </a:r>
-            <a:r>
-              <a:rPr lang="en-US" sz="1800" dirty="0" smtClean="0"/>
+              <a:rPr lang="en-US" sz="1800" dirty="0"/>
+              <a:t> [</a:t>
+            </a:r>
+            <a:r>
+              <a:rPr lang="en-US" sz="1800" dirty="0" err="1"/>
+              <a:t>TestMethod</a:t>
+            </a:r>
+            <a:r>
+              <a:rPr lang="en-US" sz="1800" dirty="0"/>
               <a:t>]</a:t>
             </a:r>
           </a:p>
           <a:p>
             <a:r>
-              <a:rPr lang="en-US" sz="1800" dirty="0" smtClean="0"/>
-              <a:t>    public class </a:t>
-            </a:r>
-            <a:r>
-              <a:rPr lang="en-US" sz="1800" dirty="0" err="1" smtClean="0"/>
-              <a:t>InstructionsScreen_Test</a:t>
-            </a:r>
-            <a:endParaRPr lang="en-US" sz="1800" dirty="0" smtClean="0"/>
-          </a:p>
-          <a:p>
-            <a:r>
-              <a:rPr lang="en-US" sz="1800" dirty="0" smtClean="0"/>
-              <a:t>    {</a:t>
-            </a:r>
-          </a:p>
-          <a:p>
-            <a:r>
-              <a:rPr lang="en-US" sz="1800" dirty="0" smtClean="0"/>
-              <a:t>        </a:t>
-            </a:r>
-            <a:r>
-              <a:rPr lang="en-US" sz="1800" dirty="0" smtClean="0"/>
-              <a:t>[</a:t>
-            </a:r>
-            <a:r>
-              <a:rPr lang="en-US" sz="1800" dirty="0" err="1" smtClean="0"/>
-              <a:t>TestInitialize</a:t>
-            </a:r>
-            <a:r>
-              <a:rPr lang="en-US" sz="1800" dirty="0" smtClean="0"/>
-              <a:t>()]</a:t>
-            </a:r>
-          </a:p>
-          <a:p>
-            <a:r>
-              <a:rPr lang="en-US" sz="1800" dirty="0" smtClean="0"/>
+              <a:rPr lang="en-US" sz="1800" dirty="0"/>
               <a:t>        public void </a:t>
             </a:r>
             <a:r>
-              <a:rPr lang="en-US" sz="1800" dirty="0" err="1" smtClean="0"/>
-              <a:t>TestInitialize</a:t>
-            </a:r>
-            <a:r>
-              <a:rPr lang="en-US" sz="1800" dirty="0" smtClean="0"/>
-              <a:t>()</a:t>
-            </a:r>
-          </a:p>
-          <a:p>
-            <a:r>
-              <a:rPr lang="en-US" sz="1800" dirty="0" smtClean="0"/>
+              <a:rPr lang="en-US" sz="1800" dirty="0" err="1"/>
+              <a:t>ShipMovingUp_Test</a:t>
+            </a:r>
+            <a:r>
+              <a:rPr lang="en-US" sz="1800" dirty="0"/>
+              <a:t>() // moving down test is just like it</a:t>
+            </a:r>
+          </a:p>
+          <a:p>
+            <a:r>
+              <a:rPr lang="en-US" sz="1800" dirty="0"/>
               <a:t>        {</a:t>
             </a:r>
           </a:p>
           <a:p>
             <a:r>
-              <a:rPr lang="en-US" sz="1800" dirty="0" smtClean="0"/>
+              <a:rPr lang="en-US" sz="1800" dirty="0"/>
               <a:t>            </a:t>
             </a:r>
             <a:r>
-              <a:rPr lang="en-US" sz="1800" dirty="0" err="1" smtClean="0"/>
-              <a:t>Starfighter</a:t>
-            </a:r>
-            <a:r>
-              <a:rPr lang="en-US" sz="1800" dirty="0" smtClean="0"/>
-              <a:t> game = new </a:t>
-            </a:r>
-            <a:r>
-              <a:rPr lang="en-US" sz="1800" dirty="0" err="1" smtClean="0"/>
-              <a:t>Starfighter</a:t>
-            </a:r>
-            <a:r>
-              <a:rPr lang="en-US" sz="1800" dirty="0" smtClean="0"/>
-              <a:t>();</a:t>
-            </a:r>
-          </a:p>
-          <a:p>
-            <a:r>
-              <a:rPr lang="en-US" sz="1800" dirty="0" smtClean="0"/>
+              <a:rPr lang="en-US" sz="1800" dirty="0" err="1"/>
+              <a:t>p.Y</a:t>
+            </a:r>
+            <a:r>
+              <a:rPr lang="en-US" sz="1800" dirty="0"/>
+              <a:t> = 0;</a:t>
+            </a:r>
+          </a:p>
+          <a:p>
+            <a:r>
+              <a:rPr lang="en-US" sz="1800" dirty="0"/>
+              <a:t>            </a:t>
+            </a:r>
+            <a:r>
+              <a:rPr lang="en-US" sz="1800" dirty="0" err="1"/>
+              <a:t>p.Y</a:t>
+            </a:r>
+            <a:r>
+              <a:rPr lang="en-US" sz="1800" dirty="0"/>
+              <a:t> += 1;</a:t>
+            </a:r>
+          </a:p>
+          <a:p>
+            <a:r>
+              <a:rPr lang="en-US" sz="1800" dirty="0"/>
+              <a:t>            </a:t>
+            </a:r>
+            <a:r>
+              <a:rPr lang="en-US" sz="1800" dirty="0" err="1"/>
+              <a:t>Assert.AreEqual</a:t>
+            </a:r>
+            <a:r>
+              <a:rPr lang="en-US" sz="1800" dirty="0"/>
+              <a:t>(1, </a:t>
+            </a:r>
+            <a:r>
+              <a:rPr lang="en-US" sz="1800" dirty="0" err="1"/>
+              <a:t>p.Y</a:t>
+            </a:r>
+            <a:r>
+              <a:rPr lang="en-US" sz="1800" dirty="0"/>
+              <a:t>);</a:t>
+            </a:r>
+          </a:p>
+          <a:p>
+            <a:r>
+              <a:rPr lang="en-US" sz="1800" dirty="0"/>
               <a:t>        }</a:t>
             </a:r>
-            <a:endParaRPr lang="en-US" sz="1800" dirty="0" smtClean="0"/>
-          </a:p>
-          <a:p>
-            <a:r>
-              <a:rPr lang="en-US" sz="1800" dirty="0" smtClean="0"/>
-              <a:t>        </a:t>
-            </a:r>
-            <a:r>
-              <a:rPr lang="en-US" sz="1800" dirty="0" err="1" smtClean="0"/>
-              <a:t>InstructionsScreen</a:t>
-            </a:r>
-            <a:r>
-              <a:rPr lang="en-US" sz="1800" dirty="0" smtClean="0"/>
-              <a:t> </a:t>
-            </a:r>
-            <a:r>
-              <a:rPr lang="en-US" sz="1800" dirty="0" err="1" smtClean="0"/>
-              <a:t>testInstructionsScreen</a:t>
-            </a:r>
-            <a:r>
-              <a:rPr lang="en-US" sz="1800" dirty="0" smtClean="0"/>
-              <a:t>;</a:t>
-            </a:r>
-          </a:p>
-          <a:p>
-            <a:r>
-              <a:rPr lang="en-US" sz="1800" dirty="0" smtClean="0"/>
-              <a:t>        private </a:t>
-            </a:r>
-            <a:r>
-              <a:rPr lang="en-US" sz="1800" dirty="0" err="1" smtClean="0"/>
-              <a:t>TestContext</a:t>
-            </a:r>
-            <a:r>
-              <a:rPr lang="en-US" sz="1800" dirty="0" smtClean="0"/>
-              <a:t> </a:t>
-            </a:r>
-            <a:r>
-              <a:rPr lang="en-US" sz="1800" dirty="0" err="1" smtClean="0"/>
-              <a:t>testContextInstance</a:t>
-            </a:r>
-            <a:r>
-              <a:rPr lang="en-US" sz="1800" dirty="0" smtClean="0"/>
-              <a:t>;</a:t>
-            </a:r>
-            <a:endParaRPr lang="en-US" sz="1800" dirty="0" smtClean="0"/>
-          </a:p>
-          <a:p>
-            <a:r>
-              <a:rPr lang="en-US" sz="1800" dirty="0" smtClean="0"/>
-              <a:t>        [</a:t>
-            </a:r>
-            <a:r>
-              <a:rPr lang="en-US" sz="1800" dirty="0" err="1" smtClean="0"/>
-              <a:t>TestMethod</a:t>
-            </a:r>
-            <a:r>
-              <a:rPr lang="en-US" sz="1800" dirty="0" smtClean="0"/>
-              <a:t>]</a:t>
-            </a:r>
-          </a:p>
-          <a:p>
-            <a:r>
-              <a:rPr lang="en-US" sz="1800" dirty="0" smtClean="0"/>
-              <a:t>        public void </a:t>
-            </a:r>
-            <a:r>
-              <a:rPr lang="en-US" sz="1800" dirty="0" err="1" smtClean="0"/>
-              <a:t>TestScreen</a:t>
-            </a:r>
-            <a:r>
-              <a:rPr lang="en-US" sz="1800" dirty="0" smtClean="0"/>
-              <a:t>()</a:t>
-            </a:r>
-          </a:p>
-          <a:p>
-            <a:r>
-              <a:rPr lang="en-US" sz="1800" dirty="0" smtClean="0"/>
-              <a:t>        {</a:t>
-            </a:r>
-          </a:p>
-          <a:p>
-            <a:r>
-              <a:rPr lang="en-US" sz="1800" dirty="0" smtClean="0"/>
-              <a:t>            </a:t>
-            </a:r>
-            <a:r>
-              <a:rPr lang="en-US" sz="1800" dirty="0" err="1" smtClean="0"/>
-              <a:t>Assert.IsNotNull</a:t>
-            </a:r>
-            <a:r>
-              <a:rPr lang="en-US" sz="1800" dirty="0" smtClean="0"/>
-              <a:t>(</a:t>
-            </a:r>
-            <a:r>
-              <a:rPr lang="en-US" sz="1800" dirty="0" err="1" smtClean="0"/>
-              <a:t>testInstructionsScreen</a:t>
-            </a:r>
-            <a:r>
-              <a:rPr lang="en-US" sz="1800" dirty="0" smtClean="0"/>
-              <a:t>);</a:t>
-            </a:r>
-          </a:p>
-          <a:p>
-            <a:r>
-              <a:rPr lang="en-US" sz="1800" dirty="0" smtClean="0"/>
-              <a:t>        }</a:t>
-            </a:r>
-          </a:p>
-          <a:p>
-            <a:endParaRPr lang="en-US" sz="1800" dirty="0" smtClean="0"/>
-          </a:p>
-          <a:p>
+          </a:p>
+          <a:p>
+            <a:pPr marL="0" indent="0">
+              <a:buNone/>
+            </a:pPr>
             <a:endParaRPr lang="en-US" sz="1800" dirty="0"/>
           </a:p>
         </p:txBody>
@@ -4668,7 +4925,7 @@
     </p:spTree>
     <p:extLst>
       <p:ext uri="{BB962C8B-B14F-4D97-AF65-F5344CB8AC3E}">
-        <p14:creationId xmlns:p14="http://schemas.microsoft.com/office/powerpoint/2010/main" xmlns="" val="755878279"/>
+        <p14:creationId xmlns="" xmlns:p14="http://schemas.microsoft.com/office/powerpoint/2010/main" val="1101534859"/>
       </p:ext>
     </p:extLst>
   </p:cSld>
@@ -4719,11 +4976,7 @@
           <a:p>
             <a:r>
               <a:rPr lang="en-US" dirty="0" smtClean="0"/>
-              <a:t>Instructions Test </a:t>
-            </a:r>
-            <a:r>
-              <a:rPr lang="en-US" dirty="0" smtClean="0"/>
-              <a:t>Code (cont)</a:t>
+              <a:t>Instructions Test Code</a:t>
             </a:r>
             <a:endParaRPr lang="en-US" dirty="0"/>
           </a:p>
@@ -4739,14 +4992,156 @@
             <p:ph idx="1"/>
           </p:nvPr>
         </p:nvSpPr>
-        <p:spPr/>
+        <p:spPr>
+          <a:xfrm>
+            <a:off x="457200" y="1219200"/>
+            <a:ext cx="8229600" cy="5410200"/>
+          </a:xfrm>
+        </p:spPr>
         <p:txBody>
           <a:bodyPr/>
           <a:lstStyle/>
           <a:p>
             <a:r>
               <a:rPr lang="en-US" sz="1800" dirty="0" smtClean="0"/>
-              <a:t> [</a:t>
+              <a:t>[</a:t>
+            </a:r>
+            <a:r>
+              <a:rPr lang="en-US" sz="1800" dirty="0" err="1" smtClean="0"/>
+              <a:t>TestClass</a:t>
+            </a:r>
+            <a:r>
+              <a:rPr lang="en-US" sz="1800" dirty="0" smtClean="0"/>
+              <a:t>]</a:t>
+            </a:r>
+          </a:p>
+          <a:p>
+            <a:r>
+              <a:rPr lang="en-US" sz="1800" dirty="0" smtClean="0"/>
+              <a:t>    public class </a:t>
+            </a:r>
+            <a:r>
+              <a:rPr lang="en-US" sz="1800" dirty="0" err="1" smtClean="0"/>
+              <a:t>InstructionsScreen_Test</a:t>
+            </a:r>
+            <a:endParaRPr lang="en-US" sz="1800" dirty="0" smtClean="0"/>
+          </a:p>
+          <a:p>
+            <a:r>
+              <a:rPr lang="en-US" sz="1800" dirty="0" smtClean="0"/>
+              <a:t>    {</a:t>
+            </a:r>
+          </a:p>
+          <a:p>
+            <a:r>
+              <a:rPr lang="en-US" sz="1800" dirty="0" smtClean="0"/>
+              <a:t>        [</a:t>
+            </a:r>
+            <a:r>
+              <a:rPr lang="en-US" sz="1800" dirty="0" err="1" smtClean="0"/>
+              <a:t>TestInitialize</a:t>
+            </a:r>
+            <a:r>
+              <a:rPr lang="en-US" sz="1800" dirty="0" smtClean="0"/>
+              <a:t>()]</a:t>
+            </a:r>
+          </a:p>
+          <a:p>
+            <a:r>
+              <a:rPr lang="en-US" sz="1800" dirty="0" smtClean="0"/>
+              <a:t>        public void </a:t>
+            </a:r>
+            <a:r>
+              <a:rPr lang="en-US" sz="1800" dirty="0" err="1" smtClean="0"/>
+              <a:t>TestInitialize</a:t>
+            </a:r>
+            <a:r>
+              <a:rPr lang="en-US" sz="1800" dirty="0" smtClean="0"/>
+              <a:t>()</a:t>
+            </a:r>
+          </a:p>
+          <a:p>
+            <a:r>
+              <a:rPr lang="en-US" sz="1800" dirty="0" smtClean="0"/>
+              <a:t>        {</a:t>
+            </a:r>
+          </a:p>
+          <a:p>
+            <a:r>
+              <a:rPr lang="en-US" sz="1800" dirty="0" smtClean="0"/>
+              <a:t>            </a:t>
+            </a:r>
+            <a:r>
+              <a:rPr lang="en-US" sz="1800" dirty="0" err="1" smtClean="0"/>
+              <a:t>Starfighter</a:t>
+            </a:r>
+            <a:r>
+              <a:rPr lang="en-US" sz="1800" dirty="0" smtClean="0"/>
+              <a:t> game = new </a:t>
+            </a:r>
+            <a:r>
+              <a:rPr lang="en-US" sz="1800" dirty="0" err="1" smtClean="0"/>
+              <a:t>Starfighter</a:t>
+            </a:r>
+            <a:r>
+              <a:rPr lang="en-US" sz="1800" dirty="0" smtClean="0"/>
+              <a:t>();</a:t>
+            </a:r>
+          </a:p>
+          <a:p>
+            <a:r>
+              <a:rPr lang="en-US" sz="1800" dirty="0" smtClean="0"/>
+              <a:t>        }</a:t>
+            </a:r>
+          </a:p>
+          <a:p>
+            <a:r>
+              <a:rPr lang="en-US" sz="1800" dirty="0" smtClean="0"/>
+              <a:t>        </a:t>
+            </a:r>
+            <a:r>
+              <a:rPr lang="en-US" sz="1800" dirty="0" err="1" smtClean="0"/>
+              <a:t>InstructionsScreen</a:t>
+            </a:r>
+            <a:r>
+              <a:rPr lang="en-US" sz="1800" dirty="0" smtClean="0"/>
+              <a:t> </a:t>
+            </a:r>
+            <a:r>
+              <a:rPr lang="en-US" sz="1800" dirty="0" err="1" smtClean="0"/>
+              <a:t>testInstructionsScreen</a:t>
+            </a:r>
+            <a:r>
+              <a:rPr lang="en-US" sz="1800" dirty="0" smtClean="0"/>
+              <a:t>;</a:t>
+            </a:r>
+          </a:p>
+          <a:p>
+            <a:r>
+              <a:rPr lang="en-US" sz="1800" dirty="0" smtClean="0"/>
+              <a:t>        private </a:t>
+            </a:r>
+            <a:r>
+              <a:rPr lang="en-US" sz="1800" dirty="0" err="1" smtClean="0"/>
+              <a:t>TestContext</a:t>
+            </a:r>
+            <a:r>
+              <a:rPr lang="en-US" sz="1800" dirty="0" smtClean="0"/>
+              <a:t> </a:t>
+            </a:r>
+            <a:r>
+              <a:rPr lang="en-US" sz="1800" dirty="0" err="1" smtClean="0"/>
+              <a:t>testContextInstance</a:t>
+            </a:r>
+            <a:r>
+              <a:rPr lang="en-US" sz="1800" dirty="0" smtClean="0"/>
+              <a:t>;</a:t>
+            </a:r>
+          </a:p>
+          <a:p>
+            <a:r>
+              <a:rPr lang="en-US" sz="1800" dirty="0" smtClean="0"/>
+              <a:t>        [</a:t>
             </a:r>
             <a:r>
               <a:rPr lang="en-US" sz="1800" dirty="0" err="1" smtClean="0"/>
@@ -4764,7 +5159,7 @@
             </a:r>
             <a:r>
               <a:rPr lang="en-US" sz="1800" dirty="0" err="1" smtClean="0"/>
-              <a:t>TestType</a:t>
+              <a:t>TestScreen</a:t>
             </a:r>
             <a:r>
               <a:rPr lang="en-US" sz="1800" dirty="0" smtClean="0"/>
@@ -4784,7 +5179,7 @@
             </a:r>
             <a:r>
               <a:rPr lang="en-US" sz="1800" dirty="0" err="1" smtClean="0"/>
-              <a:t>Assert.IsInstanceOfType</a:t>
+              <a:t>Assert.IsNotNull</a:t>
             </a:r>
             <a:r>
               <a:rPr lang="en-US" sz="1800" dirty="0" smtClean="0"/>
@@ -4796,131 +5191,19 @@
             </a:r>
             <a:r>
               <a:rPr lang="en-US" sz="1800" dirty="0" smtClean="0"/>
-              <a:t>, </a:t>
-            </a:r>
-            <a:r>
-              <a:rPr lang="en-US" sz="1800" dirty="0" err="1" smtClean="0"/>
-              <a:t>typeof</a:t>
-            </a:r>
+              <a:t>);</a:t>
+            </a:r>
+          </a:p>
+          <a:p>
             <a:r>
               <a:rPr lang="en-US" sz="1800" dirty="0" smtClean="0"/>
-              <a:t>(</a:t>
-            </a:r>
-            <a:r>
-              <a:rPr lang="en-US" sz="1800" dirty="0" err="1" smtClean="0"/>
-              <a:t>InstructionsScreen</a:t>
-            </a:r>
-            <a:r>
-              <a:rPr lang="en-US" sz="1800" dirty="0" smtClean="0"/>
-              <a:t>));</a:t>
-            </a:r>
-          </a:p>
-          <a:p>
-            <a:r>
-              <a:rPr lang="en-US" sz="1800" dirty="0" smtClean="0"/>
-              <a:t>        </a:t>
-            </a:r>
-            <a:r>
-              <a:rPr lang="en-US" sz="1800" dirty="0" smtClean="0"/>
-              <a:t>}</a:t>
-            </a:r>
+              <a:t>        }</a:t>
+            </a:r>
+          </a:p>
+          <a:p>
             <a:endParaRPr lang="en-US" sz="1800" dirty="0" smtClean="0"/>
           </a:p>
           <a:p>
-            <a:r>
-              <a:rPr lang="en-US" sz="1800" dirty="0" smtClean="0"/>
-              <a:t>    }</a:t>
-            </a:r>
-          </a:p>
-          <a:p>
-            <a:r>
-              <a:rPr lang="en-US" sz="1800" dirty="0" smtClean="0"/>
-              <a:t>public </a:t>
-            </a:r>
-            <a:r>
-              <a:rPr lang="en-US" sz="1800" dirty="0" err="1" smtClean="0"/>
-              <a:t>TestContext</a:t>
-            </a:r>
-            <a:r>
-              <a:rPr lang="en-US" sz="1800" dirty="0" smtClean="0"/>
-              <a:t> </a:t>
-            </a:r>
-            <a:r>
-              <a:rPr lang="en-US" sz="1800" dirty="0" err="1" smtClean="0"/>
-              <a:t>TestContext</a:t>
-            </a:r>
-            <a:r>
-              <a:rPr lang="en-US" sz="1800" dirty="0" smtClean="0"/>
-              <a:t>     </a:t>
-            </a:r>
-            <a:r>
-              <a:rPr lang="en-US" sz="1800" dirty="0" smtClean="0"/>
-              <a:t>{</a:t>
-            </a:r>
-          </a:p>
-          <a:p>
-            <a:r>
-              <a:rPr lang="en-US" sz="1800" dirty="0" smtClean="0"/>
-              <a:t>            get</a:t>
-            </a:r>
-          </a:p>
-          <a:p>
-            <a:r>
-              <a:rPr lang="en-US" sz="1800" dirty="0" smtClean="0"/>
-              <a:t>            </a:t>
-            </a:r>
-            <a:r>
-              <a:rPr lang="en-US" sz="1800" dirty="0" smtClean="0"/>
-              <a:t>{                </a:t>
-            </a:r>
-            <a:r>
-              <a:rPr lang="en-US" sz="1800" dirty="0" smtClean="0"/>
-              <a:t>return </a:t>
-            </a:r>
-            <a:r>
-              <a:rPr lang="en-US" sz="1800" dirty="0" err="1" smtClean="0"/>
-              <a:t>testContextInstance</a:t>
-            </a:r>
-            <a:r>
-              <a:rPr lang="en-US" sz="1800" dirty="0" smtClean="0"/>
-              <a:t>;            </a:t>
-            </a:r>
-            <a:r>
-              <a:rPr lang="en-US" sz="1800" dirty="0" smtClean="0"/>
-              <a:t>}</a:t>
-            </a:r>
-          </a:p>
-          <a:p>
-            <a:r>
-              <a:rPr lang="en-US" sz="1800" dirty="0" smtClean="0"/>
-              <a:t>            set</a:t>
-            </a:r>
-          </a:p>
-          <a:p>
-            <a:r>
-              <a:rPr lang="en-US" sz="1800" dirty="0" smtClean="0"/>
-              <a:t>            </a:t>
-            </a:r>
-            <a:r>
-              <a:rPr lang="en-US" sz="1800" dirty="0" smtClean="0"/>
-              <a:t>{                </a:t>
-            </a:r>
-            <a:r>
-              <a:rPr lang="en-US" sz="1800" dirty="0" err="1" smtClean="0"/>
-              <a:t>testContextInstance</a:t>
-            </a:r>
-            <a:r>
-              <a:rPr lang="en-US" sz="1800" dirty="0" smtClean="0"/>
-              <a:t> = value</a:t>
-            </a:r>
-            <a:r>
-              <a:rPr lang="en-US" sz="1800" dirty="0" smtClean="0"/>
-              <a:t>;            </a:t>
-            </a:r>
-            <a:r>
-              <a:rPr lang="en-US" sz="1800" dirty="0" smtClean="0"/>
-              <a:t>}</a:t>
-            </a:r>
             <a:endParaRPr lang="en-US" sz="1800" dirty="0"/>
           </a:p>
         </p:txBody>
@@ -4928,7 +5211,7 @@
     </p:spTree>
     <p:extLst>
       <p:ext uri="{BB962C8B-B14F-4D97-AF65-F5344CB8AC3E}">
-        <p14:creationId xmlns:p14="http://schemas.microsoft.com/office/powerpoint/2010/main" xmlns="" val="755878279"/>
+        <p14:creationId xmlns="" xmlns:p14="http://schemas.microsoft.com/office/powerpoint/2010/main" val="755878279"/>
       </p:ext>
     </p:extLst>
   </p:cSld>
@@ -4979,7 +5262,7 @@
           <a:p>
             <a:r>
               <a:rPr lang="en-US" dirty="0" smtClean="0"/>
-              <a:t>Laser Test Code</a:t>
+              <a:t>Instructions Test Code (cont)</a:t>
             </a:r>
             <a:endParaRPr lang="en-US" dirty="0"/>
           </a:p>
@@ -5000,9 +5283,150 @@
           <a:bodyPr/>
           <a:lstStyle/>
           <a:p>
-            <a:pPr marL="0" indent="0">
-              <a:buNone/>
-            </a:pPr>
+            <a:r>
+              <a:rPr lang="en-US" sz="1800" dirty="0" smtClean="0"/>
+              <a:t> [</a:t>
+            </a:r>
+            <a:r>
+              <a:rPr lang="en-US" sz="1800" dirty="0" err="1" smtClean="0"/>
+              <a:t>TestMethod</a:t>
+            </a:r>
+            <a:r>
+              <a:rPr lang="en-US" sz="1800" dirty="0" smtClean="0"/>
+              <a:t>]</a:t>
+            </a:r>
+          </a:p>
+          <a:p>
+            <a:r>
+              <a:rPr lang="en-US" sz="1800" dirty="0" smtClean="0"/>
+              <a:t>        public void </a:t>
+            </a:r>
+            <a:r>
+              <a:rPr lang="en-US" sz="1800" dirty="0" err="1" smtClean="0"/>
+              <a:t>TestType</a:t>
+            </a:r>
+            <a:r>
+              <a:rPr lang="en-US" sz="1800" dirty="0" smtClean="0"/>
+              <a:t>()</a:t>
+            </a:r>
+          </a:p>
+          <a:p>
+            <a:r>
+              <a:rPr lang="en-US" sz="1800" dirty="0" smtClean="0"/>
+              <a:t>        {</a:t>
+            </a:r>
+          </a:p>
+          <a:p>
+            <a:r>
+              <a:rPr lang="en-US" sz="1800" dirty="0" smtClean="0"/>
+              <a:t>            </a:t>
+            </a:r>
+            <a:r>
+              <a:rPr lang="en-US" sz="1800" dirty="0" err="1" smtClean="0"/>
+              <a:t>Assert.IsInstanceOfType</a:t>
+            </a:r>
+            <a:r>
+              <a:rPr lang="en-US" sz="1800" dirty="0" smtClean="0"/>
+              <a:t>(</a:t>
+            </a:r>
+            <a:r>
+              <a:rPr lang="en-US" sz="1800" dirty="0" err="1" smtClean="0"/>
+              <a:t>testInstructionsScreen</a:t>
+            </a:r>
+            <a:r>
+              <a:rPr lang="en-US" sz="1800" dirty="0" smtClean="0"/>
+              <a:t>, </a:t>
+            </a:r>
+            <a:r>
+              <a:rPr lang="en-US" sz="1800" dirty="0" err="1" smtClean="0"/>
+              <a:t>typeof</a:t>
+            </a:r>
+            <a:r>
+              <a:rPr lang="en-US" sz="1800" dirty="0" smtClean="0"/>
+              <a:t>(</a:t>
+            </a:r>
+            <a:r>
+              <a:rPr lang="en-US" sz="1800" dirty="0" err="1" smtClean="0"/>
+              <a:t>InstructionsScreen</a:t>
+            </a:r>
+            <a:r>
+              <a:rPr lang="en-US" sz="1800" dirty="0" smtClean="0"/>
+              <a:t>));</a:t>
+            </a:r>
+          </a:p>
+          <a:p>
+            <a:r>
+              <a:rPr lang="en-US" sz="1800" dirty="0" smtClean="0"/>
+              <a:t>        }</a:t>
+            </a:r>
+          </a:p>
+          <a:p>
+            <a:r>
+              <a:rPr lang="en-US" sz="1800" dirty="0" smtClean="0"/>
+              <a:t>    }</a:t>
+            </a:r>
+          </a:p>
+          <a:p>
+            <a:r>
+              <a:rPr lang="en-US" sz="1800" dirty="0" smtClean="0"/>
+              <a:t>public </a:t>
+            </a:r>
+            <a:r>
+              <a:rPr lang="en-US" sz="1800" dirty="0" err="1" smtClean="0"/>
+              <a:t>TestContext</a:t>
+            </a:r>
+            <a:r>
+              <a:rPr lang="en-US" sz="1800" dirty="0" smtClean="0"/>
+              <a:t> </a:t>
+            </a:r>
+            <a:r>
+              <a:rPr lang="en-US" sz="1800" dirty="0" err="1" smtClean="0"/>
+              <a:t>TestContext</a:t>
+            </a:r>
+            <a:r>
+              <a:rPr lang="en-US" sz="1800" dirty="0" smtClean="0"/>
+              <a:t>     {</a:t>
+            </a:r>
+          </a:p>
+          <a:p>
+            <a:r>
+              <a:rPr lang="en-US" sz="1800" dirty="0" smtClean="0"/>
+              <a:t>            get</a:t>
+            </a:r>
+          </a:p>
+          <a:p>
+            <a:r>
+              <a:rPr lang="en-US" sz="1800" dirty="0" smtClean="0"/>
+              <a:t>            {                return </a:t>
+            </a:r>
+            <a:r>
+              <a:rPr lang="en-US" sz="1800" dirty="0" err="1" smtClean="0"/>
+              <a:t>testContextInstance</a:t>
+            </a:r>
+            <a:r>
+              <a:rPr lang="en-US" sz="1800" dirty="0" smtClean="0"/>
+              <a:t>;            }</a:t>
+            </a:r>
+          </a:p>
+          <a:p>
+            <a:r>
+              <a:rPr lang="en-US" sz="1800" dirty="0" smtClean="0"/>
+              <a:t>            set</a:t>
+            </a:r>
+          </a:p>
+          <a:p>
+            <a:r>
+              <a:rPr lang="en-US" sz="1800" dirty="0" smtClean="0"/>
+              <a:t>            {                </a:t>
+            </a:r>
+            <a:r>
+              <a:rPr lang="en-US" sz="1800" dirty="0" err="1" smtClean="0"/>
+              <a:t>testContextInstance</a:t>
+            </a:r>
+            <a:r>
+              <a:rPr lang="en-US" sz="1800" dirty="0" smtClean="0"/>
+              <a:t> = value;            }</a:t>
+            </a:r>
             <a:endParaRPr lang="en-US" sz="1800" dirty="0"/>
           </a:p>
         </p:txBody>
@@ -5010,7 +5434,7 @@
     </p:spTree>
     <p:extLst>
       <p:ext uri="{BB962C8B-B14F-4D97-AF65-F5344CB8AC3E}">
-        <p14:creationId xmlns:p14="http://schemas.microsoft.com/office/powerpoint/2010/main" xmlns="" val="755878279"/>
+        <p14:creationId xmlns="" xmlns:p14="http://schemas.microsoft.com/office/powerpoint/2010/main" val="755878279"/>
       </p:ext>
     </p:extLst>
   </p:cSld>

</xml_diff>